<commit_message>
changed slides and visio te reflect reduction in member servers
</commit_message>
<xml_diff>
--- a/WS1-DSCOverview/Slides.pptx
+++ b/WS1-DSCOverview/Slides.pptx
@@ -10889,7 +10889,7 @@
       </p:sp>
       <p:pic>
         <p:nvPicPr>
-          <p:cNvPr id="2" name="Picture 1"/>
+          <p:cNvPr id="4" name="Picture 3"/>
           <p:cNvPicPr>
             <a:picLocks noChangeAspect="1"/>
           </p:cNvPicPr>
@@ -10903,8 +10903,8 @@
         </p:blipFill>
         <p:spPr>
           <a:xfrm>
-            <a:off x="827584" y="1916832"/>
-            <a:ext cx="7390877" cy="4104456"/>
+            <a:off x="1331640" y="2132856"/>
+            <a:ext cx="6497445" cy="3608297"/>
           </a:xfrm>
           <a:prstGeom prst="rect">
             <a:avLst/>

</xml_diff>

<commit_message>
added imperative vs declarative slide
</commit_message>
<xml_diff>
--- a/WS1-DSCOverview/Slides.pptx
+++ b/WS1-DSCOverview/Slides.pptx
@@ -6,10 +6,10 @@
     <p:sldMasterId id="2147483809" r:id="rId2"/>
   </p:sldMasterIdLst>
   <p:notesMasterIdLst>
-    <p:notesMasterId r:id="rId47"/>
+    <p:notesMasterId r:id="rId48"/>
   </p:notesMasterIdLst>
   <p:handoutMasterIdLst>
-    <p:handoutMasterId r:id="rId48"/>
+    <p:handoutMasterId r:id="rId49"/>
   </p:handoutMasterIdLst>
   <p:sldIdLst>
     <p:sldId id="356" r:id="rId3"/>
@@ -19,43 +19,44 @@
     <p:sldId id="346" r:id="rId7"/>
     <p:sldId id="358" r:id="rId8"/>
     <p:sldId id="318" r:id="rId9"/>
-    <p:sldId id="354" r:id="rId10"/>
-    <p:sldId id="355" r:id="rId11"/>
-    <p:sldId id="319" r:id="rId12"/>
-    <p:sldId id="323" r:id="rId13"/>
-    <p:sldId id="325" r:id="rId14"/>
-    <p:sldId id="320" r:id="rId15"/>
-    <p:sldId id="326" r:id="rId16"/>
-    <p:sldId id="322" r:id="rId17"/>
-    <p:sldId id="327" r:id="rId18"/>
-    <p:sldId id="344" r:id="rId19"/>
-    <p:sldId id="353" r:id="rId20"/>
-    <p:sldId id="328" r:id="rId21"/>
-    <p:sldId id="337" r:id="rId22"/>
-    <p:sldId id="338" r:id="rId23"/>
-    <p:sldId id="345" r:id="rId24"/>
-    <p:sldId id="341" r:id="rId25"/>
-    <p:sldId id="329" r:id="rId26"/>
-    <p:sldId id="330" r:id="rId27"/>
-    <p:sldId id="331" r:id="rId28"/>
-    <p:sldId id="332" r:id="rId29"/>
-    <p:sldId id="333" r:id="rId30"/>
-    <p:sldId id="334" r:id="rId31"/>
-    <p:sldId id="335" r:id="rId32"/>
-    <p:sldId id="340" r:id="rId33"/>
-    <p:sldId id="339" r:id="rId34"/>
-    <p:sldId id="352" r:id="rId35"/>
-    <p:sldId id="342" r:id="rId36"/>
-    <p:sldId id="343" r:id="rId37"/>
-    <p:sldId id="336" r:id="rId38"/>
-    <p:sldId id="347" r:id="rId39"/>
-    <p:sldId id="350" r:id="rId40"/>
-    <p:sldId id="351" r:id="rId41"/>
-    <p:sldId id="348" r:id="rId42"/>
-    <p:sldId id="349" r:id="rId43"/>
-    <p:sldId id="302" r:id="rId44"/>
-    <p:sldId id="313" r:id="rId45"/>
-    <p:sldId id="314" r:id="rId46"/>
+    <p:sldId id="359" r:id="rId10"/>
+    <p:sldId id="354" r:id="rId11"/>
+    <p:sldId id="355" r:id="rId12"/>
+    <p:sldId id="319" r:id="rId13"/>
+    <p:sldId id="323" r:id="rId14"/>
+    <p:sldId id="325" r:id="rId15"/>
+    <p:sldId id="320" r:id="rId16"/>
+    <p:sldId id="326" r:id="rId17"/>
+    <p:sldId id="322" r:id="rId18"/>
+    <p:sldId id="327" r:id="rId19"/>
+    <p:sldId id="344" r:id="rId20"/>
+    <p:sldId id="353" r:id="rId21"/>
+    <p:sldId id="328" r:id="rId22"/>
+    <p:sldId id="337" r:id="rId23"/>
+    <p:sldId id="338" r:id="rId24"/>
+    <p:sldId id="345" r:id="rId25"/>
+    <p:sldId id="341" r:id="rId26"/>
+    <p:sldId id="329" r:id="rId27"/>
+    <p:sldId id="330" r:id="rId28"/>
+    <p:sldId id="331" r:id="rId29"/>
+    <p:sldId id="332" r:id="rId30"/>
+    <p:sldId id="333" r:id="rId31"/>
+    <p:sldId id="334" r:id="rId32"/>
+    <p:sldId id="335" r:id="rId33"/>
+    <p:sldId id="340" r:id="rId34"/>
+    <p:sldId id="339" r:id="rId35"/>
+    <p:sldId id="352" r:id="rId36"/>
+    <p:sldId id="342" r:id="rId37"/>
+    <p:sldId id="343" r:id="rId38"/>
+    <p:sldId id="336" r:id="rId39"/>
+    <p:sldId id="347" r:id="rId40"/>
+    <p:sldId id="350" r:id="rId41"/>
+    <p:sldId id="351" r:id="rId42"/>
+    <p:sldId id="348" r:id="rId43"/>
+    <p:sldId id="349" r:id="rId44"/>
+    <p:sldId id="302" r:id="rId45"/>
+    <p:sldId id="313" r:id="rId46"/>
+    <p:sldId id="314" r:id="rId47"/>
   </p:sldIdLst>
   <p:sldSz cx="9144000" cy="6858000" type="screen4x3"/>
   <p:notesSz cx="7099300" cy="10234613"/>
@@ -4362,6 +4363,139 @@
           <a:chExt cx="0" cy="0"/>
         </a:xfrm>
       </p:grpSpPr>
+      <p:sp>
+        <p:nvSpPr>
+          <p:cNvPr id="2" name="Content Placeholder 1"/>
+          <p:cNvSpPr>
+            <a:spLocks noGrp="1"/>
+          </p:cNvSpPr>
+          <p:nvPr>
+            <p:ph idx="1"/>
+          </p:nvPr>
+        </p:nvSpPr>
+        <p:spPr/>
+        <p:txBody>
+          <a:bodyPr/>
+          <a:lstStyle/>
+          <a:p>
+            <a:r>
+              <a:rPr lang="en-US" dirty="0">
+                <a:effectLst/>
+              </a:rPr>
+              <a:t>Windows Server 2012 R2</a:t>
+            </a:r>
+          </a:p>
+          <a:p>
+            <a:r>
+              <a:rPr lang="en-US" dirty="0">
+                <a:effectLst/>
+              </a:rPr>
+              <a:t>Windows Server 2012</a:t>
+            </a:r>
+          </a:p>
+          <a:p>
+            <a:r>
+              <a:rPr lang="en-US" dirty="0">
+                <a:effectLst/>
+              </a:rPr>
+              <a:t>Windows Server 2008 R2 SP1</a:t>
+            </a:r>
+          </a:p>
+          <a:p>
+            <a:r>
+              <a:rPr lang="en-US" dirty="0">
+                <a:effectLst/>
+              </a:rPr>
+              <a:t>Windows 8.1</a:t>
+            </a:r>
+          </a:p>
+          <a:p>
+            <a:r>
+              <a:rPr lang="en-US" dirty="0">
+                <a:effectLst/>
+              </a:rPr>
+              <a:t>Windows 7 SP1</a:t>
+            </a:r>
+          </a:p>
+          <a:p>
+            <a:r>
+              <a:rPr lang="en-US" dirty="0"/>
+              <a:t>Not applicable for Windows Server 2016</a:t>
+            </a:r>
+          </a:p>
+          <a:p>
+            <a:pPr lvl="1"/>
+            <a:r>
+              <a:rPr lang="en-US" dirty="0"/>
+              <a:t>Includes WMF 5.1 level components already</a:t>
+            </a:r>
+          </a:p>
+        </p:txBody>
+      </p:sp>
+      <p:sp>
+        <p:nvSpPr>
+          <p:cNvPr id="3" name="Title 2"/>
+          <p:cNvSpPr>
+            <a:spLocks noGrp="1"/>
+          </p:cNvSpPr>
+          <p:nvPr>
+            <p:ph type="title"/>
+          </p:nvPr>
+        </p:nvSpPr>
+        <p:spPr/>
+        <p:txBody>
+          <a:bodyPr/>
+          <a:lstStyle/>
+          <a:p>
+            <a:r>
+              <a:rPr lang="en-US" dirty="0"/>
+              <a:t>WMF 5.1 support</a:t>
+            </a:r>
+          </a:p>
+        </p:txBody>
+      </p:sp>
+    </p:spTree>
+    <p:extLst>
+      <p:ext uri="{BB962C8B-B14F-4D97-AF65-F5344CB8AC3E}">
+        <p14:creationId xmlns:p14="http://schemas.microsoft.com/office/powerpoint/2010/main" val="3674710944"/>
+      </p:ext>
+    </p:extLst>
+  </p:cSld>
+  <p:clrMapOvr>
+    <a:masterClrMapping/>
+  </p:clrMapOvr>
+  <mc:AlternateContent xmlns:mc="http://schemas.openxmlformats.org/markup-compatibility/2006" xmlns:p14="http://schemas.microsoft.com/office/powerpoint/2010/main">
+    <mc:Choice Requires="p14">
+      <p:transition spd="slow" p14:dur="1300">
+        <p14:pan dir="u"/>
+      </p:transition>
+    </mc:Choice>
+    <mc:Fallback xmlns="">
+      <p:transition spd="slow">
+        <p:fade/>
+      </p:transition>
+    </mc:Fallback>
+  </mc:AlternateContent>
+</p:sld>
+</file>
+
+<file path=ppt/slides/slide11.xml><?xml version="1.0" encoding="utf-8"?>
+<p:sld xmlns:a="http://schemas.openxmlformats.org/drawingml/2006/main" xmlns:r="http://schemas.openxmlformats.org/officeDocument/2006/relationships" xmlns:p="http://schemas.openxmlformats.org/presentationml/2006/main">
+  <p:cSld>
+    <p:spTree>
+      <p:nvGrpSpPr>
+        <p:cNvPr id="1" name=""/>
+        <p:cNvGrpSpPr/>
+        <p:nvPr/>
+      </p:nvGrpSpPr>
+      <p:grpSpPr>
+        <a:xfrm>
+          <a:off x="0" y="0"/>
+          <a:ext cx="0" cy="0"/>
+          <a:chOff x="0" y="0"/>
+          <a:chExt cx="0" cy="0"/>
+        </a:xfrm>
+      </p:grpSpPr>
       <p:pic>
         <p:nvPicPr>
           <p:cNvPr id="4" name="Content Placeholder 3"/>
@@ -4702,110 +4836,6 @@
 </p:sld>
 </file>
 
-<file path=ppt/slides/slide11.xml><?xml version="1.0" encoding="utf-8"?>
-<p:sld xmlns:a="http://schemas.openxmlformats.org/drawingml/2006/main" xmlns:r="http://schemas.openxmlformats.org/officeDocument/2006/relationships" xmlns:p="http://schemas.openxmlformats.org/presentationml/2006/main">
-  <p:cSld>
-    <p:spTree>
-      <p:nvGrpSpPr>
-        <p:cNvPr id="1" name=""/>
-        <p:cNvGrpSpPr/>
-        <p:nvPr/>
-      </p:nvGrpSpPr>
-      <p:grpSpPr>
-        <a:xfrm>
-          <a:off x="0" y="0"/>
-          <a:ext cx="0" cy="0"/>
-          <a:chOff x="0" y="0"/>
-          <a:chExt cx="0" cy="0"/>
-        </a:xfrm>
-      </p:grpSpPr>
-      <p:sp>
-        <p:nvSpPr>
-          <p:cNvPr id="2" name="Content Placeholder 1"/>
-          <p:cNvSpPr>
-            <a:spLocks noGrp="1"/>
-          </p:cNvSpPr>
-          <p:nvPr>
-            <p:ph idx="1"/>
-          </p:nvPr>
-        </p:nvSpPr>
-        <p:spPr/>
-        <p:txBody>
-          <a:bodyPr/>
-          <a:lstStyle/>
-          <a:p>
-            <a:r>
-              <a:rPr lang="en-US" dirty="0"/>
-              <a:t>PSDesiredStateConfiguration Module</a:t>
-            </a:r>
-          </a:p>
-          <a:p>
-            <a:r>
-              <a:rPr lang="en-US" dirty="0"/>
-              <a:t>Dynamic Keywords that enable configuration authoring</a:t>
-            </a:r>
-          </a:p>
-          <a:p>
-            <a:r>
-              <a:rPr lang="en-US" dirty="0"/>
-              <a:t>Declarative Syntax</a:t>
-            </a:r>
-          </a:p>
-          <a:p>
-            <a:r>
-              <a:rPr lang="en-US" dirty="0"/>
-              <a:t>Cmdlets to compile and manage configurations</a:t>
-            </a:r>
-          </a:p>
-        </p:txBody>
-      </p:sp>
-      <p:sp>
-        <p:nvSpPr>
-          <p:cNvPr id="3" name="Title 2"/>
-          <p:cNvSpPr>
-            <a:spLocks noGrp="1"/>
-          </p:cNvSpPr>
-          <p:nvPr>
-            <p:ph type="title"/>
-          </p:nvPr>
-        </p:nvSpPr>
-        <p:spPr/>
-        <p:txBody>
-          <a:bodyPr/>
-          <a:lstStyle/>
-          <a:p>
-            <a:r>
-              <a:rPr lang="en-US" dirty="0"/>
-              <a:t>Language Extensions</a:t>
-            </a:r>
-          </a:p>
-        </p:txBody>
-      </p:sp>
-    </p:spTree>
-    <p:extLst>
-      <p:ext uri="{BB962C8B-B14F-4D97-AF65-F5344CB8AC3E}">
-        <p14:creationId xmlns:p14="http://schemas.microsoft.com/office/powerpoint/2010/main" val="2732845045"/>
-      </p:ext>
-    </p:extLst>
-  </p:cSld>
-  <p:clrMapOvr>
-    <a:masterClrMapping/>
-  </p:clrMapOvr>
-  <mc:AlternateContent xmlns:mc="http://schemas.openxmlformats.org/markup-compatibility/2006" xmlns:p14="http://schemas.microsoft.com/office/powerpoint/2010/main">
-    <mc:Choice Requires="p14">
-      <p:transition spd="slow" p14:dur="1300">
-        <p14:pan dir="u"/>
-      </p:transition>
-    </mc:Choice>
-    <mc:Fallback xmlns="">
-      <p:transition spd="slow">
-        <p:fade/>
-      </p:transition>
-    </mc:Fallback>
-  </mc:AlternateContent>
-</p:sld>
-</file>
-
 <file path=ppt/slides/slide12.xml><?xml version="1.0" encoding="utf-8"?>
 <p:sld xmlns:a="http://schemas.openxmlformats.org/drawingml/2006/main" xmlns:r="http://schemas.openxmlformats.org/officeDocument/2006/relationships" xmlns:p="http://schemas.openxmlformats.org/presentationml/2006/main">
   <p:cSld>
@@ -4825,7 +4855,47 @@
       </p:grpSpPr>
       <p:sp>
         <p:nvSpPr>
-          <p:cNvPr id="2" name="Title 1"/>
+          <p:cNvPr id="2" name="Content Placeholder 1"/>
+          <p:cNvSpPr>
+            <a:spLocks noGrp="1"/>
+          </p:cNvSpPr>
+          <p:nvPr>
+            <p:ph idx="1"/>
+          </p:nvPr>
+        </p:nvSpPr>
+        <p:spPr/>
+        <p:txBody>
+          <a:bodyPr/>
+          <a:lstStyle/>
+          <a:p>
+            <a:r>
+              <a:rPr lang="en-US" dirty="0"/>
+              <a:t>PSDesiredStateConfiguration Module</a:t>
+            </a:r>
+          </a:p>
+          <a:p>
+            <a:r>
+              <a:rPr lang="en-US" dirty="0"/>
+              <a:t>Dynamic Keywords that enable configuration authoring</a:t>
+            </a:r>
+          </a:p>
+          <a:p>
+            <a:r>
+              <a:rPr lang="en-US" dirty="0"/>
+              <a:t>Declarative Syntax</a:t>
+            </a:r>
+          </a:p>
+          <a:p>
+            <a:r>
+              <a:rPr lang="en-US" dirty="0"/>
+              <a:t>Cmdlets to compile and manage configurations</a:t>
+            </a:r>
+          </a:p>
+        </p:txBody>
+      </p:sp>
+      <p:sp>
+        <p:nvSpPr>
+          <p:cNvPr id="3" name="Title 2"/>
           <p:cNvSpPr>
             <a:spLocks noGrp="1"/>
           </p:cNvSpPr>
@@ -4840,37 +4910,7 @@
           <a:p>
             <a:r>
               <a:rPr lang="en-US" dirty="0"/>
-              <a:t>Start-Demo –Item ‘</a:t>
-            </a:r>
-            <a:r>
-              <a:rPr lang="en-US" dirty="0" err="1"/>
-              <a:t>LangaugeExt</a:t>
-            </a:r>
-            <a:r>
-              <a:rPr lang="en-US" dirty="0"/>
-              <a:t>’</a:t>
-            </a:r>
-          </a:p>
-        </p:txBody>
-      </p:sp>
-      <p:sp>
-        <p:nvSpPr>
-          <p:cNvPr id="3" name="Text Placeholder 2"/>
-          <p:cNvSpPr>
-            <a:spLocks noGrp="1"/>
-          </p:cNvSpPr>
-          <p:nvPr>
-            <p:ph type="body" idx="1"/>
-          </p:nvPr>
-        </p:nvSpPr>
-        <p:spPr/>
-        <p:txBody>
-          <a:bodyPr/>
-          <a:lstStyle/>
-          <a:p>
-            <a:r>
-              <a:rPr lang="en-US" dirty="0"/>
-              <a:t>Exploring PSDesiredStateConfiguration Module and Language Extensions</a:t>
+              <a:t>Language Extensions</a:t>
             </a:r>
           </a:p>
         </p:txBody>
@@ -4878,7 +4918,7 @@
     </p:spTree>
     <p:extLst>
       <p:ext uri="{BB962C8B-B14F-4D97-AF65-F5344CB8AC3E}">
-        <p14:creationId xmlns:p14="http://schemas.microsoft.com/office/powerpoint/2010/main" val="567563931"/>
+        <p14:creationId xmlns:p14="http://schemas.microsoft.com/office/powerpoint/2010/main" val="2732845045"/>
       </p:ext>
     </p:extLst>
   </p:cSld>
@@ -4919,56 +4959,7 @@
       </p:grpSpPr>
       <p:sp>
         <p:nvSpPr>
-          <p:cNvPr id="2" name="Content Placeholder 1"/>
-          <p:cNvSpPr>
-            <a:spLocks noGrp="1"/>
-          </p:cNvSpPr>
-          <p:nvPr>
-            <p:ph idx="1"/>
-          </p:nvPr>
-        </p:nvSpPr>
-        <p:spPr/>
-        <p:txBody>
-          <a:bodyPr/>
-          <a:lstStyle/>
-          <a:p>
-            <a:r>
-              <a:rPr lang="en-US" dirty="0"/>
-              <a:t>The OS “agent” … sort of!</a:t>
-            </a:r>
-          </a:p>
-          <a:p>
-            <a:r>
-              <a:rPr lang="en-US" dirty="0"/>
-              <a:t>Implemented as a WMI provider.</a:t>
-            </a:r>
-          </a:p>
-          <a:p>
-            <a:r>
-              <a:rPr lang="en-US" dirty="0"/>
-              <a:t>Can be configured in a declarative manner using Meta Resources.</a:t>
-            </a:r>
-          </a:p>
-          <a:p>
-            <a:r>
-              <a:rPr lang="en-US" dirty="0"/>
-              <a:t>Ability to receive (push) or pull configurations.</a:t>
-            </a:r>
-          </a:p>
-          <a:p>
-            <a:endParaRPr lang="en-US" dirty="0"/>
-          </a:p>
-          <a:p>
-            <a:endParaRPr lang="en-US" dirty="0"/>
-          </a:p>
-          <a:p>
-            <a:endParaRPr lang="en-US" dirty="0"/>
-          </a:p>
-        </p:txBody>
-      </p:sp>
-      <p:sp>
-        <p:nvSpPr>
-          <p:cNvPr id="3" name="Title 2"/>
+          <p:cNvPr id="2" name="Title 1"/>
           <p:cNvSpPr>
             <a:spLocks noGrp="1"/>
           </p:cNvSpPr>
@@ -4983,7 +4974,37 @@
           <a:p>
             <a:r>
               <a:rPr lang="en-US" dirty="0"/>
-              <a:t>Local Configuration Manager</a:t>
+              <a:t>Start-Demo –Item ‘</a:t>
+            </a:r>
+            <a:r>
+              <a:rPr lang="en-US" dirty="0" err="1"/>
+              <a:t>LangaugeExt</a:t>
+            </a:r>
+            <a:r>
+              <a:rPr lang="en-US" dirty="0"/>
+              <a:t>’</a:t>
+            </a:r>
+          </a:p>
+        </p:txBody>
+      </p:sp>
+      <p:sp>
+        <p:nvSpPr>
+          <p:cNvPr id="3" name="Text Placeholder 2"/>
+          <p:cNvSpPr>
+            <a:spLocks noGrp="1"/>
+          </p:cNvSpPr>
+          <p:nvPr>
+            <p:ph type="body" idx="1"/>
+          </p:nvPr>
+        </p:nvSpPr>
+        <p:spPr/>
+        <p:txBody>
+          <a:bodyPr/>
+          <a:lstStyle/>
+          <a:p>
+            <a:r>
+              <a:rPr lang="en-US" dirty="0"/>
+              <a:t>Exploring PSDesiredStateConfiguration Module and Language Extensions</a:t>
             </a:r>
           </a:p>
         </p:txBody>
@@ -4991,7 +5012,7 @@
     </p:spTree>
     <p:extLst>
       <p:ext uri="{BB962C8B-B14F-4D97-AF65-F5344CB8AC3E}">
-        <p14:creationId xmlns:p14="http://schemas.microsoft.com/office/powerpoint/2010/main" val="1390337015"/>
+        <p14:creationId xmlns:p14="http://schemas.microsoft.com/office/powerpoint/2010/main" val="567563931"/>
       </p:ext>
     </p:extLst>
   </p:cSld>
@@ -5032,6 +5053,119 @@
       </p:grpSpPr>
       <p:sp>
         <p:nvSpPr>
+          <p:cNvPr id="2" name="Content Placeholder 1"/>
+          <p:cNvSpPr>
+            <a:spLocks noGrp="1"/>
+          </p:cNvSpPr>
+          <p:nvPr>
+            <p:ph idx="1"/>
+          </p:nvPr>
+        </p:nvSpPr>
+        <p:spPr/>
+        <p:txBody>
+          <a:bodyPr/>
+          <a:lstStyle/>
+          <a:p>
+            <a:r>
+              <a:rPr lang="en-US" dirty="0"/>
+              <a:t>The OS “agent” … sort of!</a:t>
+            </a:r>
+          </a:p>
+          <a:p>
+            <a:r>
+              <a:rPr lang="en-US" dirty="0"/>
+              <a:t>Implemented as a WMI provider.</a:t>
+            </a:r>
+          </a:p>
+          <a:p>
+            <a:r>
+              <a:rPr lang="en-US" dirty="0"/>
+              <a:t>Can be configured in a declarative manner using Meta Resources.</a:t>
+            </a:r>
+          </a:p>
+          <a:p>
+            <a:r>
+              <a:rPr lang="en-US" dirty="0"/>
+              <a:t>Ability to receive (push) or pull configurations.</a:t>
+            </a:r>
+          </a:p>
+          <a:p>
+            <a:endParaRPr lang="en-US" dirty="0"/>
+          </a:p>
+          <a:p>
+            <a:endParaRPr lang="en-US" dirty="0"/>
+          </a:p>
+          <a:p>
+            <a:endParaRPr lang="en-US" dirty="0"/>
+          </a:p>
+        </p:txBody>
+      </p:sp>
+      <p:sp>
+        <p:nvSpPr>
+          <p:cNvPr id="3" name="Title 2"/>
+          <p:cNvSpPr>
+            <a:spLocks noGrp="1"/>
+          </p:cNvSpPr>
+          <p:nvPr>
+            <p:ph type="title"/>
+          </p:nvPr>
+        </p:nvSpPr>
+        <p:spPr/>
+        <p:txBody>
+          <a:bodyPr/>
+          <a:lstStyle/>
+          <a:p>
+            <a:r>
+              <a:rPr lang="en-US" dirty="0"/>
+              <a:t>Local Configuration Manager</a:t>
+            </a:r>
+          </a:p>
+        </p:txBody>
+      </p:sp>
+    </p:spTree>
+    <p:extLst>
+      <p:ext uri="{BB962C8B-B14F-4D97-AF65-F5344CB8AC3E}">
+        <p14:creationId xmlns:p14="http://schemas.microsoft.com/office/powerpoint/2010/main" val="1390337015"/>
+      </p:ext>
+    </p:extLst>
+  </p:cSld>
+  <p:clrMapOvr>
+    <a:masterClrMapping/>
+  </p:clrMapOvr>
+  <mc:AlternateContent xmlns:mc="http://schemas.openxmlformats.org/markup-compatibility/2006" xmlns:p14="http://schemas.microsoft.com/office/powerpoint/2010/main">
+    <mc:Choice Requires="p14">
+      <p:transition spd="slow" p14:dur="1300">
+        <p14:pan dir="u"/>
+      </p:transition>
+    </mc:Choice>
+    <mc:Fallback xmlns="">
+      <p:transition spd="slow">
+        <p:fade/>
+      </p:transition>
+    </mc:Fallback>
+  </mc:AlternateContent>
+</p:sld>
+</file>
+
+<file path=ppt/slides/slide15.xml><?xml version="1.0" encoding="utf-8"?>
+<p:sld xmlns:a="http://schemas.openxmlformats.org/drawingml/2006/main" xmlns:r="http://schemas.openxmlformats.org/officeDocument/2006/relationships" xmlns:p="http://schemas.openxmlformats.org/presentationml/2006/main">
+  <p:cSld>
+    <p:spTree>
+      <p:nvGrpSpPr>
+        <p:cNvPr id="1" name=""/>
+        <p:cNvGrpSpPr/>
+        <p:nvPr/>
+      </p:nvGrpSpPr>
+      <p:grpSpPr>
+        <a:xfrm>
+          <a:off x="0" y="0"/>
+          <a:ext cx="0" cy="0"/>
+          <a:chOff x="0" y="0"/>
+          <a:chExt cx="0" cy="0"/>
+        </a:xfrm>
+      </p:grpSpPr>
+      <p:sp>
+        <p:nvSpPr>
           <p:cNvPr id="2" name="Title 1"/>
           <p:cNvSpPr>
             <a:spLocks noGrp="1"/>
@@ -5107,7 +5241,7 @@
 </p:sld>
 </file>
 
-<file path=ppt/slides/slide15.xml><?xml version="1.0" encoding="utf-8"?>
+<file path=ppt/slides/slide16.xml><?xml version="1.0" encoding="utf-8"?>
 <p:sld xmlns:a="http://schemas.openxmlformats.org/drawingml/2006/main" xmlns:r="http://schemas.openxmlformats.org/officeDocument/2006/relationships" xmlns:p="http://schemas.openxmlformats.org/presentationml/2006/main">
   <p:cSld>
     <p:spTree>
@@ -5260,7 +5394,7 @@
 </p:sld>
 </file>
 
-<file path=ppt/slides/slide16.xml><?xml version="1.0" encoding="utf-8"?>
+<file path=ppt/slides/slide17.xml><?xml version="1.0" encoding="utf-8"?>
 <p:sld xmlns:a="http://schemas.openxmlformats.org/drawingml/2006/main" xmlns:r="http://schemas.openxmlformats.org/officeDocument/2006/relationships" xmlns:p="http://schemas.openxmlformats.org/presentationml/2006/main">
   <p:cSld>
     <p:spTree>
@@ -5368,7 +5502,7 @@
 </p:sld>
 </file>
 
-<file path=ppt/slides/slide17.xml><?xml version="1.0" encoding="utf-8"?>
+<file path=ppt/slides/slide18.xml><?xml version="1.0" encoding="utf-8"?>
 <p:sld xmlns:a="http://schemas.openxmlformats.org/drawingml/2006/main" xmlns:r="http://schemas.openxmlformats.org/officeDocument/2006/relationships" xmlns:p="http://schemas.openxmlformats.org/presentationml/2006/main">
   <p:cSld>
     <p:spTree>
@@ -6019,100 +6153,6 @@
 </p:sld>
 </file>
 
-<file path=ppt/slides/slide18.xml><?xml version="1.0" encoding="utf-8"?>
-<p:sld xmlns:a="http://schemas.openxmlformats.org/drawingml/2006/main" xmlns:r="http://schemas.openxmlformats.org/officeDocument/2006/relationships" xmlns:p="http://schemas.openxmlformats.org/presentationml/2006/main">
-  <p:cSld>
-    <p:spTree>
-      <p:nvGrpSpPr>
-        <p:cNvPr id="1" name=""/>
-        <p:cNvGrpSpPr/>
-        <p:nvPr/>
-      </p:nvGrpSpPr>
-      <p:grpSpPr>
-        <a:xfrm>
-          <a:off x="0" y="0"/>
-          <a:ext cx="0" cy="0"/>
-          <a:chOff x="0" y="0"/>
-          <a:chExt cx="0" cy="0"/>
-        </a:xfrm>
-      </p:grpSpPr>
-      <p:sp>
-        <p:nvSpPr>
-          <p:cNvPr id="2" name="Title 1"/>
-          <p:cNvSpPr>
-            <a:spLocks noGrp="1"/>
-          </p:cNvSpPr>
-          <p:nvPr>
-            <p:ph type="title"/>
-          </p:nvPr>
-        </p:nvSpPr>
-        <p:spPr/>
-        <p:txBody>
-          <a:bodyPr/>
-          <a:lstStyle/>
-          <a:p>
-            <a:r>
-              <a:rPr lang="en-US" dirty="0"/>
-              <a:t>Start-Demo –Item ‘</a:t>
-            </a:r>
-            <a:r>
-              <a:rPr lang="en-US" dirty="0" err="1"/>
-              <a:t>ConfigAnatomy</a:t>
-            </a:r>
-            <a:r>
-              <a:rPr lang="en-US" dirty="0"/>
-              <a:t>’</a:t>
-            </a:r>
-          </a:p>
-        </p:txBody>
-      </p:sp>
-      <p:sp>
-        <p:nvSpPr>
-          <p:cNvPr id="3" name="Text Placeholder 2"/>
-          <p:cNvSpPr>
-            <a:spLocks noGrp="1"/>
-          </p:cNvSpPr>
-          <p:nvPr>
-            <p:ph type="body" idx="1"/>
-          </p:nvPr>
-        </p:nvSpPr>
-        <p:spPr/>
-        <p:txBody>
-          <a:bodyPr/>
-          <a:lstStyle/>
-          <a:p>
-            <a:r>
-              <a:rPr lang="en-US" dirty="0"/>
-              <a:t>Writing basic DSC configuration documents</a:t>
-            </a:r>
-          </a:p>
-        </p:txBody>
-      </p:sp>
-    </p:spTree>
-    <p:extLst>
-      <p:ext uri="{BB962C8B-B14F-4D97-AF65-F5344CB8AC3E}">
-        <p14:creationId xmlns:p14="http://schemas.microsoft.com/office/powerpoint/2010/main" val="1398353277"/>
-      </p:ext>
-    </p:extLst>
-  </p:cSld>
-  <p:clrMapOvr>
-    <a:masterClrMapping/>
-  </p:clrMapOvr>
-  <mc:AlternateContent xmlns:mc="http://schemas.openxmlformats.org/markup-compatibility/2006" xmlns:p14="http://schemas.microsoft.com/office/powerpoint/2010/main">
-    <mc:Choice Requires="p14">
-      <p:transition spd="slow" p14:dur="1300">
-        <p14:pan dir="u"/>
-      </p:transition>
-    </mc:Choice>
-    <mc:Fallback xmlns="">
-      <p:transition spd="slow">
-        <p:fade/>
-      </p:transition>
-    </mc:Fallback>
-  </mc:AlternateContent>
-</p:sld>
-</file>
-
 <file path=ppt/slides/slide19.xml><?xml version="1.0" encoding="utf-8"?>
 <p:sld xmlns:a="http://schemas.openxmlformats.org/drawingml/2006/main" xmlns:r="http://schemas.openxmlformats.org/officeDocument/2006/relationships" xmlns:p="http://schemas.openxmlformats.org/presentationml/2006/main">
   <p:cSld>
@@ -6151,7 +6191,7 @@
             </a:r>
             <a:r>
               <a:rPr lang="en-US" dirty="0" err="1"/>
-              <a:t>BasicConfigAuthoring</a:t>
+              <a:t>ConfigAnatomy</a:t>
             </a:r>
             <a:r>
               <a:rPr lang="en-US" dirty="0"/>
@@ -6185,7 +6225,7 @@
     </p:spTree>
     <p:extLst>
       <p:ext uri="{BB962C8B-B14F-4D97-AF65-F5344CB8AC3E}">
-        <p14:creationId xmlns:p14="http://schemas.microsoft.com/office/powerpoint/2010/main" val="3348477763"/>
+        <p14:creationId xmlns:p14="http://schemas.microsoft.com/office/powerpoint/2010/main" val="1398353277"/>
       </p:ext>
     </p:extLst>
   </p:cSld>
@@ -6371,7 +6411,7 @@
             </a:r>
             <a:r>
               <a:rPr lang="en-US" dirty="0" err="1"/>
-              <a:t>PushConfig</a:t>
+              <a:t>BasicConfigAuthoring</a:t>
             </a:r>
             <a:r>
               <a:rPr lang="en-US" dirty="0"/>
@@ -6397,7 +6437,7 @@
           <a:p>
             <a:r>
               <a:rPr lang="en-US" dirty="0"/>
-              <a:t>Pushing DSC configurations to target nodes</a:t>
+              <a:t>Writing basic DSC configuration documents</a:t>
             </a:r>
           </a:p>
         </p:txBody>
@@ -6405,7 +6445,7 @@
     </p:spTree>
     <p:extLst>
       <p:ext uri="{BB962C8B-B14F-4D97-AF65-F5344CB8AC3E}">
-        <p14:creationId xmlns:p14="http://schemas.microsoft.com/office/powerpoint/2010/main" val="1383547368"/>
+        <p14:creationId xmlns:p14="http://schemas.microsoft.com/office/powerpoint/2010/main" val="3348477763"/>
       </p:ext>
     </p:extLst>
   </p:cSld>
@@ -6465,7 +6505,7 @@
             </a:r>
             <a:r>
               <a:rPr lang="en-US" dirty="0" err="1"/>
-              <a:t>ReportDSCConfig</a:t>
+              <a:t>PushConfig</a:t>
             </a:r>
             <a:r>
               <a:rPr lang="en-US" dirty="0"/>
@@ -6491,7 +6531,7 @@
           <a:p>
             <a:r>
               <a:rPr lang="en-US" dirty="0"/>
-              <a:t>Using the DSC status cmdlets to check configuration state</a:t>
+              <a:t>Pushing DSC configurations to target nodes</a:t>
             </a:r>
           </a:p>
         </p:txBody>
@@ -6499,7 +6539,7 @@
     </p:spTree>
     <p:extLst>
       <p:ext uri="{BB962C8B-B14F-4D97-AF65-F5344CB8AC3E}">
-        <p14:creationId xmlns:p14="http://schemas.microsoft.com/office/powerpoint/2010/main" val="1806174524"/>
+        <p14:creationId xmlns:p14="http://schemas.microsoft.com/office/powerpoint/2010/main" val="1383547368"/>
       </p:ext>
     </p:extLst>
   </p:cSld>
@@ -6559,7 +6599,7 @@
             </a:r>
             <a:r>
               <a:rPr lang="en-US" dirty="0" err="1"/>
-              <a:t>FindingResources</a:t>
+              <a:t>ReportDSCConfig</a:t>
             </a:r>
             <a:r>
               <a:rPr lang="en-US" dirty="0"/>
@@ -6585,7 +6625,7 @@
           <a:p>
             <a:r>
               <a:rPr lang="en-US" dirty="0"/>
-              <a:t>Finding in-box and custom resources for writing configuration documents</a:t>
+              <a:t>Using the DSC status cmdlets to check configuration state</a:t>
             </a:r>
           </a:p>
         </p:txBody>
@@ -6593,7 +6633,7 @@
     </p:spTree>
     <p:extLst>
       <p:ext uri="{BB962C8B-B14F-4D97-AF65-F5344CB8AC3E}">
-        <p14:creationId xmlns:p14="http://schemas.microsoft.com/office/powerpoint/2010/main" val="3612630159"/>
+        <p14:creationId xmlns:p14="http://schemas.microsoft.com/office/powerpoint/2010/main" val="1806174524"/>
       </p:ext>
     </p:extLst>
   </p:cSld>
@@ -6653,7 +6693,7 @@
             </a:r>
             <a:r>
               <a:rPr lang="en-US" dirty="0" err="1"/>
-              <a:t>ParameterizedConfigs</a:t>
+              <a:t>FindingResources</a:t>
             </a:r>
             <a:r>
               <a:rPr lang="en-US" dirty="0"/>
@@ -6679,7 +6719,7 @@
           <a:p>
             <a:r>
               <a:rPr lang="en-US" dirty="0"/>
-              <a:t>Parameterized configurations for promoting re-use</a:t>
+              <a:t>Finding in-box and custom resources for writing configuration documents</a:t>
             </a:r>
           </a:p>
         </p:txBody>
@@ -6687,7 +6727,7 @@
     </p:spTree>
     <p:extLst>
       <p:ext uri="{BB962C8B-B14F-4D97-AF65-F5344CB8AC3E}">
-        <p14:creationId xmlns:p14="http://schemas.microsoft.com/office/powerpoint/2010/main" val="310246172"/>
+        <p14:creationId xmlns:p14="http://schemas.microsoft.com/office/powerpoint/2010/main" val="3612630159"/>
       </p:ext>
     </p:extLst>
   </p:cSld>
@@ -6728,35 +6768,7 @@
       </p:grpSpPr>
       <p:sp>
         <p:nvSpPr>
-          <p:cNvPr id="2" name="Content Placeholder 1"/>
-          <p:cNvSpPr>
-            <a:spLocks noGrp="1"/>
-          </p:cNvSpPr>
-          <p:nvPr>
-            <p:ph idx="1"/>
-          </p:nvPr>
-        </p:nvSpPr>
-        <p:spPr/>
-        <p:txBody>
-          <a:bodyPr/>
-          <a:lstStyle/>
-          <a:p>
-            <a:r>
-              <a:rPr lang="en-US" dirty="0"/>
-              <a:t>Make the configuration documents more dynamic and parameterized</a:t>
-            </a:r>
-          </a:p>
-          <a:p>
-            <a:r>
-              <a:rPr lang="en-US" dirty="0"/>
-              <a:t>Promote better re-use and conditional configuration of resources</a:t>
-            </a:r>
-          </a:p>
-        </p:txBody>
-      </p:sp>
-      <p:sp>
-        <p:nvSpPr>
-          <p:cNvPr id="3" name="Title 2"/>
+          <p:cNvPr id="2" name="Title 1"/>
           <p:cNvSpPr>
             <a:spLocks noGrp="1"/>
           </p:cNvSpPr>
@@ -6771,7 +6783,37 @@
           <a:p>
             <a:r>
               <a:rPr lang="en-US" dirty="0"/>
-              <a:t>Configuration Data</a:t>
+              <a:t>Start-Demo –Item ‘</a:t>
+            </a:r>
+            <a:r>
+              <a:rPr lang="en-US" dirty="0" err="1"/>
+              <a:t>ParameterizedConfigs</a:t>
+            </a:r>
+            <a:r>
+              <a:rPr lang="en-US" dirty="0"/>
+              <a:t>’</a:t>
+            </a:r>
+          </a:p>
+        </p:txBody>
+      </p:sp>
+      <p:sp>
+        <p:nvSpPr>
+          <p:cNvPr id="3" name="Text Placeholder 2"/>
+          <p:cNvSpPr>
+            <a:spLocks noGrp="1"/>
+          </p:cNvSpPr>
+          <p:nvPr>
+            <p:ph type="body" idx="1"/>
+          </p:nvPr>
+        </p:nvSpPr>
+        <p:spPr/>
+        <p:txBody>
+          <a:bodyPr/>
+          <a:lstStyle/>
+          <a:p>
+            <a:r>
+              <a:rPr lang="en-US" dirty="0"/>
+              <a:t>Parameterized configurations for promoting re-use</a:t>
             </a:r>
           </a:p>
         </p:txBody>
@@ -6779,7 +6821,7 @@
     </p:spTree>
     <p:extLst>
       <p:ext uri="{BB962C8B-B14F-4D97-AF65-F5344CB8AC3E}">
-        <p14:creationId xmlns:p14="http://schemas.microsoft.com/office/powerpoint/2010/main" val="3626979295"/>
+        <p14:creationId xmlns:p14="http://schemas.microsoft.com/office/powerpoint/2010/main" val="310246172"/>
       </p:ext>
     </p:extLst>
   </p:cSld>
@@ -6820,7 +6862,35 @@
       </p:grpSpPr>
       <p:sp>
         <p:nvSpPr>
-          <p:cNvPr id="2" name="Title 1"/>
+          <p:cNvPr id="2" name="Content Placeholder 1"/>
+          <p:cNvSpPr>
+            <a:spLocks noGrp="1"/>
+          </p:cNvSpPr>
+          <p:nvPr>
+            <p:ph idx="1"/>
+          </p:nvPr>
+        </p:nvSpPr>
+        <p:spPr/>
+        <p:txBody>
+          <a:bodyPr/>
+          <a:lstStyle/>
+          <a:p>
+            <a:r>
+              <a:rPr lang="en-US" dirty="0"/>
+              <a:t>Make the configuration documents more dynamic and parameterized</a:t>
+            </a:r>
+          </a:p>
+          <a:p>
+            <a:r>
+              <a:rPr lang="en-US" dirty="0"/>
+              <a:t>Promote better re-use and conditional configuration of resources</a:t>
+            </a:r>
+          </a:p>
+        </p:txBody>
+      </p:sp>
+      <p:sp>
+        <p:nvSpPr>
+          <p:cNvPr id="3" name="Title 2"/>
           <p:cNvSpPr>
             <a:spLocks noGrp="1"/>
           </p:cNvSpPr>
@@ -6835,37 +6905,7 @@
           <a:p>
             <a:r>
               <a:rPr lang="en-US" dirty="0"/>
-              <a:t>Start-Demo –Item ‘</a:t>
-            </a:r>
-            <a:r>
-              <a:rPr lang="en-US" dirty="0" err="1"/>
-              <a:t>ConfigDataInDSC</a:t>
-            </a:r>
-            <a:r>
-              <a:rPr lang="en-US" dirty="0"/>
-              <a:t>’</a:t>
-            </a:r>
-          </a:p>
-        </p:txBody>
-      </p:sp>
-      <p:sp>
-        <p:nvSpPr>
-          <p:cNvPr id="3" name="Text Placeholder 2"/>
-          <p:cNvSpPr>
-            <a:spLocks noGrp="1"/>
-          </p:cNvSpPr>
-          <p:nvPr>
-            <p:ph type="body" idx="1"/>
-          </p:nvPr>
-        </p:nvSpPr>
-        <p:spPr/>
-        <p:txBody>
-          <a:bodyPr/>
-          <a:lstStyle/>
-          <a:p>
-            <a:r>
-              <a:rPr lang="en-US" dirty="0"/>
-              <a:t>Using Configuration Data to create re-usable configuration documents</a:t>
+              <a:t>Configuration Data</a:t>
             </a:r>
           </a:p>
         </p:txBody>
@@ -6873,7 +6913,7 @@
     </p:spTree>
     <p:extLst>
       <p:ext uri="{BB962C8B-B14F-4D97-AF65-F5344CB8AC3E}">
-        <p14:creationId xmlns:p14="http://schemas.microsoft.com/office/powerpoint/2010/main" val="3670691054"/>
+        <p14:creationId xmlns:p14="http://schemas.microsoft.com/office/powerpoint/2010/main" val="3626979295"/>
       </p:ext>
     </p:extLst>
   </p:cSld>
@@ -6914,35 +6954,7 @@
       </p:grpSpPr>
       <p:sp>
         <p:nvSpPr>
-          <p:cNvPr id="2" name="Content Placeholder 1"/>
-          <p:cNvSpPr>
-            <a:spLocks noGrp="1"/>
-          </p:cNvSpPr>
-          <p:nvPr>
-            <p:ph idx="1"/>
-          </p:nvPr>
-        </p:nvSpPr>
-        <p:spPr/>
-        <p:txBody>
-          <a:bodyPr/>
-          <a:lstStyle/>
-          <a:p>
-            <a:r>
-              <a:rPr lang="en-US" dirty="0"/>
-              <a:t>Plain-text credentials not suitable for production.</a:t>
-            </a:r>
-          </a:p>
-          <a:p>
-            <a:r>
-              <a:rPr lang="en-US" dirty="0"/>
-              <a:t>Should implement certificate-based encryption/decryption of credentials.</a:t>
-            </a:r>
-          </a:p>
-        </p:txBody>
-      </p:sp>
-      <p:sp>
-        <p:nvSpPr>
-          <p:cNvPr id="3" name="Title 2"/>
+          <p:cNvPr id="2" name="Title 1"/>
           <p:cNvSpPr>
             <a:spLocks noGrp="1"/>
           </p:cNvSpPr>
@@ -6957,7 +6969,37 @@
           <a:p>
             <a:r>
               <a:rPr lang="en-US" dirty="0"/>
-              <a:t>Credentials in Configuration</a:t>
+              <a:t>Start-Demo –Item ‘</a:t>
+            </a:r>
+            <a:r>
+              <a:rPr lang="en-US" dirty="0" err="1"/>
+              <a:t>ConfigDataInDSC</a:t>
+            </a:r>
+            <a:r>
+              <a:rPr lang="en-US" dirty="0"/>
+              <a:t>’</a:t>
+            </a:r>
+          </a:p>
+        </p:txBody>
+      </p:sp>
+      <p:sp>
+        <p:nvSpPr>
+          <p:cNvPr id="3" name="Text Placeholder 2"/>
+          <p:cNvSpPr>
+            <a:spLocks noGrp="1"/>
+          </p:cNvSpPr>
+          <p:nvPr>
+            <p:ph type="body" idx="1"/>
+          </p:nvPr>
+        </p:nvSpPr>
+        <p:spPr/>
+        <p:txBody>
+          <a:bodyPr/>
+          <a:lstStyle/>
+          <a:p>
+            <a:r>
+              <a:rPr lang="en-US" dirty="0"/>
+              <a:t>Using Configuration Data to create re-usable configuration documents</a:t>
             </a:r>
           </a:p>
         </p:txBody>
@@ -6965,7 +7007,7 @@
     </p:spTree>
     <p:extLst>
       <p:ext uri="{BB962C8B-B14F-4D97-AF65-F5344CB8AC3E}">
-        <p14:creationId xmlns:p14="http://schemas.microsoft.com/office/powerpoint/2010/main" val="1410111601"/>
+        <p14:creationId xmlns:p14="http://schemas.microsoft.com/office/powerpoint/2010/main" val="3670691054"/>
       </p:ext>
     </p:extLst>
   </p:cSld>
@@ -7006,7 +7048,35 @@
       </p:grpSpPr>
       <p:sp>
         <p:nvSpPr>
-          <p:cNvPr id="2" name="Title 1"/>
+          <p:cNvPr id="2" name="Content Placeholder 1"/>
+          <p:cNvSpPr>
+            <a:spLocks noGrp="1"/>
+          </p:cNvSpPr>
+          <p:nvPr>
+            <p:ph idx="1"/>
+          </p:nvPr>
+        </p:nvSpPr>
+        <p:spPr/>
+        <p:txBody>
+          <a:bodyPr/>
+          <a:lstStyle/>
+          <a:p>
+            <a:r>
+              <a:rPr lang="en-US" dirty="0"/>
+              <a:t>Plain-text credentials not suitable for production.</a:t>
+            </a:r>
+          </a:p>
+          <a:p>
+            <a:r>
+              <a:rPr lang="en-US" dirty="0"/>
+              <a:t>Should implement certificate-based encryption/decryption of credentials.</a:t>
+            </a:r>
+          </a:p>
+        </p:txBody>
+      </p:sp>
+      <p:sp>
+        <p:nvSpPr>
+          <p:cNvPr id="3" name="Title 2"/>
           <p:cNvSpPr>
             <a:spLocks noGrp="1"/>
           </p:cNvSpPr>
@@ -7021,37 +7091,7 @@
           <a:p>
             <a:r>
               <a:rPr lang="en-US" dirty="0"/>
-              <a:t>Start-Demo –Item ‘</a:t>
-            </a:r>
-            <a:r>
-              <a:rPr lang="en-US" dirty="0" err="1"/>
-              <a:t>PlainTextCreds</a:t>
-            </a:r>
-            <a:r>
-              <a:rPr lang="en-US" dirty="0"/>
-              <a:t>’</a:t>
-            </a:r>
-          </a:p>
-        </p:txBody>
-      </p:sp>
-      <p:sp>
-        <p:nvSpPr>
-          <p:cNvPr id="3" name="Text Placeholder 2"/>
-          <p:cNvSpPr>
-            <a:spLocks noGrp="1"/>
-          </p:cNvSpPr>
-          <p:nvPr>
-            <p:ph type="body" idx="1"/>
-          </p:nvPr>
-        </p:nvSpPr>
-        <p:spPr/>
-        <p:txBody>
-          <a:bodyPr/>
-          <a:lstStyle/>
-          <a:p>
-            <a:r>
-              <a:rPr lang="en-US" dirty="0"/>
-              <a:t>Implementing Plain-Text Credentials in configuration documents</a:t>
+              <a:t>Credentials in Configuration</a:t>
             </a:r>
           </a:p>
         </p:txBody>
@@ -7059,7 +7099,7 @@
     </p:spTree>
     <p:extLst>
       <p:ext uri="{BB962C8B-B14F-4D97-AF65-F5344CB8AC3E}">
-        <p14:creationId xmlns:p14="http://schemas.microsoft.com/office/powerpoint/2010/main" val="3612969697"/>
+        <p14:creationId xmlns:p14="http://schemas.microsoft.com/office/powerpoint/2010/main" val="1410111601"/>
       </p:ext>
     </p:extLst>
   </p:cSld>
@@ -7119,7 +7159,7 @@
             </a:r>
             <a:r>
               <a:rPr lang="en-US" dirty="0" err="1"/>
-              <a:t>SecureCredentials</a:t>
+              <a:t>PlainTextCreds</a:t>
             </a:r>
             <a:r>
               <a:rPr lang="en-US" dirty="0"/>
@@ -7145,7 +7185,7 @@
           <a:p>
             <a:r>
               <a:rPr lang="en-US" dirty="0"/>
-              <a:t>Implementing Secure Credentials in configuration documents using certificates</a:t>
+              <a:t>Implementing Plain-Text Credentials in configuration documents</a:t>
             </a:r>
           </a:p>
         </p:txBody>
@@ -7153,7 +7193,7 @@
     </p:spTree>
     <p:extLst>
       <p:ext uri="{BB962C8B-B14F-4D97-AF65-F5344CB8AC3E}">
-        <p14:creationId xmlns:p14="http://schemas.microsoft.com/office/powerpoint/2010/main" val="910355252"/>
+        <p14:creationId xmlns:p14="http://schemas.microsoft.com/office/powerpoint/2010/main" val="3612969697"/>
       </p:ext>
     </p:extLst>
   </p:cSld>
@@ -7194,7 +7234,7 @@
       </p:grpSpPr>
       <p:sp>
         <p:nvSpPr>
-          <p:cNvPr id="2" name="Titel 1"/>
+          <p:cNvPr id="2" name="Title 1"/>
           <p:cNvSpPr>
             <a:spLocks noGrp="1"/>
           </p:cNvSpPr>
@@ -7202,34 +7242,34 @@
             <p:ph type="title"/>
           </p:nvPr>
         </p:nvSpPr>
-        <p:spPr>
-          <a:xfrm>
-            <a:off x="0" y="908720"/>
-            <a:ext cx="9144000" cy="792088"/>
-          </a:xfrm>
-          <a:prstGeom prst="rect">
-            <a:avLst/>
-          </a:prstGeom>
-        </p:spPr>
+        <p:spPr/>
         <p:txBody>
           <a:bodyPr/>
           <a:lstStyle/>
           <a:p>
             <a:r>
-              <a:rPr lang="de-DE" dirty="0"/>
-              <a:t>RunAs Credentials</a:t>
-            </a:r>
-          </a:p>
-        </p:txBody>
-      </p:sp>
-      <p:sp>
-        <p:nvSpPr>
-          <p:cNvPr id="3" name="Inhaltsplatzhalter 2"/>
+              <a:rPr lang="en-US" dirty="0"/>
+              <a:t>Start-Demo –Item ‘</a:t>
+            </a:r>
+            <a:r>
+              <a:rPr lang="en-US" dirty="0" err="1"/>
+              <a:t>SecureCredentials</a:t>
+            </a:r>
+            <a:r>
+              <a:rPr lang="en-US" dirty="0"/>
+              <a:t>’</a:t>
+            </a:r>
+          </a:p>
+        </p:txBody>
+      </p:sp>
+      <p:sp>
+        <p:nvSpPr>
+          <p:cNvPr id="3" name="Text Placeholder 2"/>
           <p:cNvSpPr>
             <a:spLocks noGrp="1"/>
           </p:cNvSpPr>
           <p:nvPr>
-            <p:ph idx="1"/>
+            <p:ph type="body" idx="1"/>
           </p:nvPr>
         </p:nvSpPr>
         <p:spPr/>
@@ -7238,200 +7278,16 @@
           <a:lstStyle/>
           <a:p>
             <a:r>
-              <a:rPr lang="de-DE" dirty="0"/>
-              <a:t>For some configuration items, the user context is important</a:t>
-            </a:r>
-          </a:p>
-          <a:p>
-            <a:pPr lvl="1"/>
-            <a:r>
-              <a:rPr lang="de-DE" dirty="0"/>
-              <a:t>Example: Registry modifications, cluster configurations, process invocation, </a:t>
-            </a:r>
-            <a:r>
-              <a:rPr lang="de-DE" dirty="0" err="1"/>
-              <a:t>remoting</a:t>
-            </a:r>
-            <a:r>
-              <a:rPr lang="de-DE" dirty="0"/>
-              <a:t> </a:t>
-            </a:r>
-            <a:r>
-              <a:rPr lang="de-DE" dirty="0" err="1"/>
-              <a:t>capabilities</a:t>
-            </a:r>
-            <a:r>
-              <a:rPr lang="de-DE" dirty="0"/>
-              <a:t> </a:t>
-            </a:r>
-            <a:r>
-              <a:rPr lang="de-DE" dirty="0" err="1"/>
-              <a:t>needed</a:t>
-            </a:r>
-            <a:r>
-              <a:rPr lang="de-DE" dirty="0"/>
-              <a:t> </a:t>
-            </a:r>
-            <a:r>
-              <a:rPr lang="de-DE" dirty="0" err="1"/>
-              <a:t>by</a:t>
-            </a:r>
-            <a:r>
-              <a:rPr lang="de-DE" dirty="0"/>
-              <a:t> </a:t>
-            </a:r>
-            <a:r>
-              <a:rPr lang="de-DE" dirty="0" err="1"/>
-              <a:t>the</a:t>
-            </a:r>
-            <a:r>
-              <a:rPr lang="de-DE" dirty="0"/>
-              <a:t> </a:t>
-            </a:r>
-            <a:r>
-              <a:rPr lang="de-DE" dirty="0" err="1"/>
-              <a:t>resource</a:t>
-            </a:r>
-            <a:r>
-              <a:rPr lang="de-DE" dirty="0"/>
-              <a:t> </a:t>
-            </a:r>
-            <a:r>
-              <a:rPr lang="de-DE" dirty="0" err="1"/>
-              <a:t>and</a:t>
-            </a:r>
-            <a:r>
-              <a:rPr lang="de-DE" dirty="0"/>
-              <a:t> so on</a:t>
-            </a:r>
-          </a:p>
-          <a:p>
-            <a:r>
-              <a:rPr lang="de-DE" dirty="0"/>
-              <a:t>PSDscRunAsCredential provides </a:t>
-            </a:r>
-            <a:r>
-              <a:rPr lang="de-DE" dirty="0" err="1"/>
-              <a:t>this</a:t>
-            </a:r>
-            <a:r>
-              <a:rPr lang="de-DE" dirty="0"/>
-              <a:t> </a:t>
-            </a:r>
-            <a:r>
-              <a:rPr lang="de-DE" dirty="0" err="1"/>
-              <a:t>ability</a:t>
-            </a:r>
-            <a:endParaRPr lang="de-DE" dirty="0"/>
-          </a:p>
-          <a:p>
-            <a:pPr lvl="1"/>
-            <a:r>
-              <a:rPr lang="de-DE" dirty="0" err="1"/>
-              <a:t>Removes</a:t>
-            </a:r>
-            <a:r>
-              <a:rPr lang="de-DE" dirty="0"/>
-              <a:t> </a:t>
-            </a:r>
-            <a:r>
-              <a:rPr lang="de-DE" dirty="0" err="1"/>
-              <a:t>the</a:t>
-            </a:r>
-            <a:r>
-              <a:rPr lang="de-DE" dirty="0"/>
-              <a:t> </a:t>
-            </a:r>
-            <a:r>
-              <a:rPr lang="de-DE" dirty="0" err="1"/>
-              <a:t>need</a:t>
-            </a:r>
-            <a:r>
-              <a:rPr lang="de-DE" dirty="0"/>
-              <a:t> </a:t>
-            </a:r>
-            <a:r>
-              <a:rPr lang="de-DE" dirty="0" err="1"/>
-              <a:t>for</a:t>
-            </a:r>
-            <a:r>
-              <a:rPr lang="de-DE" dirty="0"/>
-              <a:t> </a:t>
-            </a:r>
-            <a:r>
-              <a:rPr lang="de-DE" dirty="0" err="1"/>
-              <a:t>Resource</a:t>
-            </a:r>
-            <a:r>
-              <a:rPr lang="de-DE" dirty="0"/>
-              <a:t> </a:t>
-            </a:r>
-            <a:r>
-              <a:rPr lang="de-DE" dirty="0" err="1"/>
-              <a:t>authors</a:t>
-            </a:r>
-            <a:r>
-              <a:rPr lang="de-DE" dirty="0"/>
-              <a:t> </a:t>
-            </a:r>
-            <a:r>
-              <a:rPr lang="de-DE" dirty="0" err="1"/>
-              <a:t>to</a:t>
-            </a:r>
-            <a:r>
-              <a:rPr lang="de-DE" dirty="0"/>
-              <a:t> </a:t>
-            </a:r>
-            <a:r>
-              <a:rPr lang="de-DE" dirty="0" err="1"/>
-              <a:t>build</a:t>
-            </a:r>
-            <a:r>
-              <a:rPr lang="de-DE" dirty="0"/>
-              <a:t> in </a:t>
-            </a:r>
-            <a:r>
-              <a:rPr lang="de-DE" dirty="0" err="1"/>
-              <a:t>credential</a:t>
-            </a:r>
-            <a:r>
-              <a:rPr lang="de-DE" dirty="0"/>
-              <a:t> </a:t>
-            </a:r>
-            <a:r>
-              <a:rPr lang="de-DE" dirty="0" err="1"/>
-              <a:t>support</a:t>
-            </a:r>
-            <a:r>
-              <a:rPr lang="de-DE" dirty="0"/>
-              <a:t> </a:t>
-            </a:r>
-            <a:r>
-              <a:rPr lang="de-DE" dirty="0" err="1"/>
-              <a:t>we</a:t>
-            </a:r>
-            <a:r>
-              <a:rPr lang="de-DE" dirty="0"/>
-              <a:t> </a:t>
-            </a:r>
-            <a:r>
-              <a:rPr lang="de-DE" dirty="0" err="1"/>
-              <a:t>had</a:t>
-            </a:r>
-            <a:r>
-              <a:rPr lang="de-DE" dirty="0"/>
-              <a:t> in v1</a:t>
-            </a:r>
-          </a:p>
-          <a:p>
-            <a:endParaRPr lang="de-DE" dirty="0"/>
+              <a:rPr lang="en-US" dirty="0"/>
+              <a:t>Implementing Secure Credentials in configuration documents using certificates</a:t>
+            </a:r>
           </a:p>
         </p:txBody>
       </p:sp>
     </p:spTree>
     <p:extLst>
       <p:ext uri="{BB962C8B-B14F-4D97-AF65-F5344CB8AC3E}">
-        <p14:creationId xmlns:p14="http://schemas.microsoft.com/office/powerpoint/2010/main" val="414990733"/>
+        <p14:creationId xmlns:p14="http://schemas.microsoft.com/office/powerpoint/2010/main" val="910355252"/>
       </p:ext>
     </p:extLst>
   </p:cSld>
@@ -7440,12 +7296,12 @@
   </p:clrMapOvr>
   <mc:AlternateContent xmlns:mc="http://schemas.openxmlformats.org/markup-compatibility/2006" xmlns:p14="http://schemas.microsoft.com/office/powerpoint/2010/main">
     <mc:Choice Requires="p14">
-      <p:transition spd="med" p14:dur="700">
-        <p:fade/>
+      <p:transition spd="slow" p14:dur="1300">
+        <p14:pan dir="u"/>
       </p:transition>
     </mc:Choice>
     <mc:Fallback xmlns="">
-      <p:transition spd="med">
+      <p:transition spd="slow">
         <p:fade/>
       </p:transition>
     </mc:Fallback>
@@ -8371,6 +8227,284 @@
       </p:grpSpPr>
       <p:sp>
         <p:nvSpPr>
+          <p:cNvPr id="2" name="Titel 1"/>
+          <p:cNvSpPr>
+            <a:spLocks noGrp="1"/>
+          </p:cNvSpPr>
+          <p:nvPr>
+            <p:ph type="title"/>
+          </p:nvPr>
+        </p:nvSpPr>
+        <p:spPr>
+          <a:xfrm>
+            <a:off x="0" y="908720"/>
+            <a:ext cx="9144000" cy="792088"/>
+          </a:xfrm>
+          <a:prstGeom prst="rect">
+            <a:avLst/>
+          </a:prstGeom>
+        </p:spPr>
+        <p:txBody>
+          <a:bodyPr/>
+          <a:lstStyle/>
+          <a:p>
+            <a:r>
+              <a:rPr lang="de-DE" dirty="0"/>
+              <a:t>RunAs Credentials</a:t>
+            </a:r>
+          </a:p>
+        </p:txBody>
+      </p:sp>
+      <p:sp>
+        <p:nvSpPr>
+          <p:cNvPr id="3" name="Inhaltsplatzhalter 2"/>
+          <p:cNvSpPr>
+            <a:spLocks noGrp="1"/>
+          </p:cNvSpPr>
+          <p:nvPr>
+            <p:ph idx="1"/>
+          </p:nvPr>
+        </p:nvSpPr>
+        <p:spPr/>
+        <p:txBody>
+          <a:bodyPr/>
+          <a:lstStyle/>
+          <a:p>
+            <a:r>
+              <a:rPr lang="de-DE" dirty="0"/>
+              <a:t>For some configuration items, the user context is important</a:t>
+            </a:r>
+          </a:p>
+          <a:p>
+            <a:pPr lvl="1"/>
+            <a:r>
+              <a:rPr lang="de-DE" dirty="0"/>
+              <a:t>Example: Registry modifications, cluster configurations, process invocation, </a:t>
+            </a:r>
+            <a:r>
+              <a:rPr lang="de-DE" dirty="0" err="1"/>
+              <a:t>remoting</a:t>
+            </a:r>
+            <a:r>
+              <a:rPr lang="de-DE" dirty="0"/>
+              <a:t> </a:t>
+            </a:r>
+            <a:r>
+              <a:rPr lang="de-DE" dirty="0" err="1"/>
+              <a:t>capabilities</a:t>
+            </a:r>
+            <a:r>
+              <a:rPr lang="de-DE" dirty="0"/>
+              <a:t> </a:t>
+            </a:r>
+            <a:r>
+              <a:rPr lang="de-DE" dirty="0" err="1"/>
+              <a:t>needed</a:t>
+            </a:r>
+            <a:r>
+              <a:rPr lang="de-DE" dirty="0"/>
+              <a:t> </a:t>
+            </a:r>
+            <a:r>
+              <a:rPr lang="de-DE" dirty="0" err="1"/>
+              <a:t>by</a:t>
+            </a:r>
+            <a:r>
+              <a:rPr lang="de-DE" dirty="0"/>
+              <a:t> </a:t>
+            </a:r>
+            <a:r>
+              <a:rPr lang="de-DE" dirty="0" err="1"/>
+              <a:t>the</a:t>
+            </a:r>
+            <a:r>
+              <a:rPr lang="de-DE" dirty="0"/>
+              <a:t> </a:t>
+            </a:r>
+            <a:r>
+              <a:rPr lang="de-DE" dirty="0" err="1"/>
+              <a:t>resource</a:t>
+            </a:r>
+            <a:r>
+              <a:rPr lang="de-DE" dirty="0"/>
+              <a:t> </a:t>
+            </a:r>
+            <a:r>
+              <a:rPr lang="de-DE" dirty="0" err="1"/>
+              <a:t>and</a:t>
+            </a:r>
+            <a:r>
+              <a:rPr lang="de-DE" dirty="0"/>
+              <a:t> so on</a:t>
+            </a:r>
+          </a:p>
+          <a:p>
+            <a:r>
+              <a:rPr lang="de-DE" dirty="0"/>
+              <a:t>PSDscRunAsCredential provides </a:t>
+            </a:r>
+            <a:r>
+              <a:rPr lang="de-DE" dirty="0" err="1"/>
+              <a:t>this</a:t>
+            </a:r>
+            <a:r>
+              <a:rPr lang="de-DE" dirty="0"/>
+              <a:t> </a:t>
+            </a:r>
+            <a:r>
+              <a:rPr lang="de-DE" dirty="0" err="1"/>
+              <a:t>ability</a:t>
+            </a:r>
+            <a:endParaRPr lang="de-DE" dirty="0"/>
+          </a:p>
+          <a:p>
+            <a:pPr lvl="1"/>
+            <a:r>
+              <a:rPr lang="de-DE" dirty="0" err="1"/>
+              <a:t>Removes</a:t>
+            </a:r>
+            <a:r>
+              <a:rPr lang="de-DE" dirty="0"/>
+              <a:t> </a:t>
+            </a:r>
+            <a:r>
+              <a:rPr lang="de-DE" dirty="0" err="1"/>
+              <a:t>the</a:t>
+            </a:r>
+            <a:r>
+              <a:rPr lang="de-DE" dirty="0"/>
+              <a:t> </a:t>
+            </a:r>
+            <a:r>
+              <a:rPr lang="de-DE" dirty="0" err="1"/>
+              <a:t>need</a:t>
+            </a:r>
+            <a:r>
+              <a:rPr lang="de-DE" dirty="0"/>
+              <a:t> </a:t>
+            </a:r>
+            <a:r>
+              <a:rPr lang="de-DE" dirty="0" err="1"/>
+              <a:t>for</a:t>
+            </a:r>
+            <a:r>
+              <a:rPr lang="de-DE" dirty="0"/>
+              <a:t> </a:t>
+            </a:r>
+            <a:r>
+              <a:rPr lang="de-DE" dirty="0" err="1"/>
+              <a:t>Resource</a:t>
+            </a:r>
+            <a:r>
+              <a:rPr lang="de-DE" dirty="0"/>
+              <a:t> </a:t>
+            </a:r>
+            <a:r>
+              <a:rPr lang="de-DE" dirty="0" err="1"/>
+              <a:t>authors</a:t>
+            </a:r>
+            <a:r>
+              <a:rPr lang="de-DE" dirty="0"/>
+              <a:t> </a:t>
+            </a:r>
+            <a:r>
+              <a:rPr lang="de-DE" dirty="0" err="1"/>
+              <a:t>to</a:t>
+            </a:r>
+            <a:r>
+              <a:rPr lang="de-DE" dirty="0"/>
+              <a:t> </a:t>
+            </a:r>
+            <a:r>
+              <a:rPr lang="de-DE" dirty="0" err="1"/>
+              <a:t>build</a:t>
+            </a:r>
+            <a:r>
+              <a:rPr lang="de-DE" dirty="0"/>
+              <a:t> in </a:t>
+            </a:r>
+            <a:r>
+              <a:rPr lang="de-DE" dirty="0" err="1"/>
+              <a:t>credential</a:t>
+            </a:r>
+            <a:r>
+              <a:rPr lang="de-DE" dirty="0"/>
+              <a:t> </a:t>
+            </a:r>
+            <a:r>
+              <a:rPr lang="de-DE" dirty="0" err="1"/>
+              <a:t>support</a:t>
+            </a:r>
+            <a:r>
+              <a:rPr lang="de-DE" dirty="0"/>
+              <a:t> </a:t>
+            </a:r>
+            <a:r>
+              <a:rPr lang="de-DE" dirty="0" err="1"/>
+              <a:t>we</a:t>
+            </a:r>
+            <a:r>
+              <a:rPr lang="de-DE" dirty="0"/>
+              <a:t> </a:t>
+            </a:r>
+            <a:r>
+              <a:rPr lang="de-DE" dirty="0" err="1"/>
+              <a:t>had</a:t>
+            </a:r>
+            <a:r>
+              <a:rPr lang="de-DE" dirty="0"/>
+              <a:t> in v1</a:t>
+            </a:r>
+          </a:p>
+          <a:p>
+            <a:endParaRPr lang="de-DE" dirty="0"/>
+          </a:p>
+        </p:txBody>
+      </p:sp>
+    </p:spTree>
+    <p:extLst>
+      <p:ext uri="{BB962C8B-B14F-4D97-AF65-F5344CB8AC3E}">
+        <p14:creationId xmlns:p14="http://schemas.microsoft.com/office/powerpoint/2010/main" val="414990733"/>
+      </p:ext>
+    </p:extLst>
+  </p:cSld>
+  <p:clrMapOvr>
+    <a:masterClrMapping/>
+  </p:clrMapOvr>
+  <mc:AlternateContent xmlns:mc="http://schemas.openxmlformats.org/markup-compatibility/2006" xmlns:p14="http://schemas.microsoft.com/office/powerpoint/2010/main">
+    <mc:Choice Requires="p14">
+      <p:transition spd="med" p14:dur="700">
+        <p:fade/>
+      </p:transition>
+    </mc:Choice>
+    <mc:Fallback xmlns="">
+      <p:transition spd="med">
+        <p:fade/>
+      </p:transition>
+    </mc:Fallback>
+  </mc:AlternateContent>
+</p:sld>
+</file>
+
+<file path=ppt/slides/slide31.xml><?xml version="1.0" encoding="utf-8"?>
+<p:sld xmlns:a="http://schemas.openxmlformats.org/drawingml/2006/main" xmlns:r="http://schemas.openxmlformats.org/officeDocument/2006/relationships" xmlns:p="http://schemas.openxmlformats.org/presentationml/2006/main">
+  <p:cSld>
+    <p:spTree>
+      <p:nvGrpSpPr>
+        <p:cNvPr id="1" name=""/>
+        <p:cNvGrpSpPr/>
+        <p:nvPr/>
+      </p:nvGrpSpPr>
+      <p:grpSpPr>
+        <a:xfrm>
+          <a:off x="0" y="0"/>
+          <a:ext cx="0" cy="0"/>
+          <a:chOff x="0" y="0"/>
+          <a:chExt cx="0" cy="0"/>
+        </a:xfrm>
+      </p:grpSpPr>
+      <p:sp>
+        <p:nvSpPr>
           <p:cNvPr id="2" name="Title 1"/>
           <p:cNvSpPr>
             <a:spLocks noGrp="1"/>
@@ -8454,7 +8588,7 @@
 </p:sld>
 </file>
 
-<file path=ppt/slides/slide31.xml><?xml version="1.0" encoding="utf-8"?>
+<file path=ppt/slides/slide32.xml><?xml version="1.0" encoding="utf-8"?>
 <p:sld xmlns:a="http://schemas.openxmlformats.org/drawingml/2006/main" xmlns:r="http://schemas.openxmlformats.org/officeDocument/2006/relationships" xmlns:p="http://schemas.openxmlformats.org/presentationml/2006/main">
   <p:cSld>
     <p:spTree>
@@ -8554,7 +8688,7 @@
 </p:sld>
 </file>
 
-<file path=ppt/slides/slide32.xml><?xml version="1.0" encoding="utf-8"?>
+<file path=ppt/slides/slide33.xml><?xml version="1.0" encoding="utf-8"?>
 <p:sld xmlns:a="http://schemas.openxmlformats.org/drawingml/2006/main" xmlns:r="http://schemas.openxmlformats.org/officeDocument/2006/relationships" xmlns:p="http://schemas.openxmlformats.org/presentationml/2006/main">
   <p:cSld>
     <p:spTree>
@@ -8656,7 +8790,7 @@
 </p:sld>
 </file>
 
-<file path=ppt/slides/slide33.xml><?xml version="1.0" encoding="utf-8"?>
+<file path=ppt/slides/slide34.xml><?xml version="1.0" encoding="utf-8"?>
 <p:sld xmlns:a="http://schemas.openxmlformats.org/drawingml/2006/main" xmlns:r="http://schemas.openxmlformats.org/officeDocument/2006/relationships" xmlns:p="http://schemas.openxmlformats.org/presentationml/2006/main">
   <p:cSld>
     <p:spTree>
@@ -8855,7 +8989,7 @@
 </p:sld>
 </file>
 
-<file path=ppt/slides/slide34.xml><?xml version="1.0" encoding="utf-8"?>
+<file path=ppt/slides/slide35.xml><?xml version="1.0" encoding="utf-8"?>
 <p:sld xmlns:a="http://schemas.openxmlformats.org/drawingml/2006/main" xmlns:r="http://schemas.openxmlformats.org/officeDocument/2006/relationships" xmlns:p="http://schemas.openxmlformats.org/presentationml/2006/main">
   <p:cSld>
     <p:spTree>
@@ -9684,7 +9818,7 @@
 </p:sld>
 </file>
 
-<file path=ppt/slides/slide35.xml><?xml version="1.0" encoding="utf-8"?>
+<file path=ppt/slides/slide36.xml><?xml version="1.0" encoding="utf-8"?>
 <p:sld xmlns:a="http://schemas.openxmlformats.org/drawingml/2006/main" xmlns:r="http://schemas.openxmlformats.org/officeDocument/2006/relationships" xmlns:p="http://schemas.openxmlformats.org/presentationml/2006/main">
   <p:cSld>
     <p:spTree>
@@ -9778,7 +9912,7 @@
 </p:sld>
 </file>
 
-<file path=ppt/slides/slide36.xml><?xml version="1.0" encoding="utf-8"?>
+<file path=ppt/slides/slide37.xml><?xml version="1.0" encoding="utf-8"?>
 <p:sld xmlns:a="http://schemas.openxmlformats.org/drawingml/2006/main" xmlns:r="http://schemas.openxmlformats.org/officeDocument/2006/relationships" xmlns:p="http://schemas.openxmlformats.org/presentationml/2006/main">
   <p:cSld>
     <p:spTree>
@@ -9878,7 +10012,7 @@
 </p:sld>
 </file>
 
-<file path=ppt/slides/slide37.xml><?xml version="1.0" encoding="utf-8"?>
+<file path=ppt/slides/slide38.xml><?xml version="1.0" encoding="utf-8"?>
 <p:sld xmlns:a="http://schemas.openxmlformats.org/drawingml/2006/main" xmlns:r="http://schemas.openxmlformats.org/officeDocument/2006/relationships" xmlns:p="http://schemas.openxmlformats.org/presentationml/2006/main">
   <p:cSld>
     <p:spTree>
@@ -9972,7 +10106,7 @@
 </p:sld>
 </file>
 
-<file path=ppt/slides/slide38.xml><?xml version="1.0" encoding="utf-8"?>
+<file path=ppt/slides/slide39.xml><?xml version="1.0" encoding="utf-8"?>
 <p:sld xmlns:a="http://schemas.openxmlformats.org/drawingml/2006/main" xmlns:r="http://schemas.openxmlformats.org/officeDocument/2006/relationships" xmlns:p="http://schemas.openxmlformats.org/presentationml/2006/main">
   <p:cSld>
     <p:spTree>
@@ -10078,106 +10212,6 @@
 </p:sld>
 </file>
 
-<file path=ppt/slides/slide39.xml><?xml version="1.0" encoding="utf-8"?>
-<p:sld xmlns:a="http://schemas.openxmlformats.org/drawingml/2006/main" xmlns:r="http://schemas.openxmlformats.org/officeDocument/2006/relationships" xmlns:p="http://schemas.openxmlformats.org/presentationml/2006/main">
-  <p:cSld>
-    <p:spTree>
-      <p:nvGrpSpPr>
-        <p:cNvPr id="1" name=""/>
-        <p:cNvGrpSpPr/>
-        <p:nvPr/>
-      </p:nvGrpSpPr>
-      <p:grpSpPr>
-        <a:xfrm>
-          <a:off x="0" y="0"/>
-          <a:ext cx="0" cy="0"/>
-          <a:chOff x="0" y="0"/>
-          <a:chExt cx="0" cy="0"/>
-        </a:xfrm>
-      </p:grpSpPr>
-      <p:sp>
-        <p:nvSpPr>
-          <p:cNvPr id="2" name="Title 1"/>
-          <p:cNvSpPr>
-            <a:spLocks noGrp="1"/>
-          </p:cNvSpPr>
-          <p:nvPr>
-            <p:ph type="title"/>
-          </p:nvPr>
-        </p:nvSpPr>
-        <p:spPr/>
-        <p:txBody>
-          <a:bodyPr/>
-          <a:lstStyle/>
-          <a:p>
-            <a:r>
-              <a:rPr lang="en-US" dirty="0"/>
-              <a:t>Start-Demo –Item ‘</a:t>
-            </a:r>
-            <a:r>
-              <a:rPr lang="en-US" dirty="0" err="1"/>
-              <a:t>DSCPullService</a:t>
-            </a:r>
-            <a:r>
-              <a:rPr lang="en-US" dirty="0"/>
-              <a:t>’</a:t>
-            </a:r>
-          </a:p>
-        </p:txBody>
-      </p:sp>
-      <p:sp>
-        <p:nvSpPr>
-          <p:cNvPr id="3" name="Text Placeholder 2"/>
-          <p:cNvSpPr>
-            <a:spLocks noGrp="1"/>
-          </p:cNvSpPr>
-          <p:nvPr>
-            <p:ph type="body" idx="1"/>
-          </p:nvPr>
-        </p:nvSpPr>
-        <p:spPr/>
-        <p:txBody>
-          <a:bodyPr/>
-          <a:lstStyle/>
-          <a:p>
-            <a:r>
-              <a:rPr lang="en-US" dirty="0"/>
-              <a:t>configuring Rest-Baser Pull Server</a:t>
-            </a:r>
-          </a:p>
-          <a:p>
-            <a:r>
-              <a:rPr lang="en-US" dirty="0"/>
-              <a:t>Configuring LCM as a pull client</a:t>
-            </a:r>
-          </a:p>
-        </p:txBody>
-      </p:sp>
-    </p:spTree>
-    <p:extLst>
-      <p:ext uri="{BB962C8B-B14F-4D97-AF65-F5344CB8AC3E}">
-        <p14:creationId xmlns:p14="http://schemas.microsoft.com/office/powerpoint/2010/main" val="1741091451"/>
-      </p:ext>
-    </p:extLst>
-  </p:cSld>
-  <p:clrMapOvr>
-    <a:masterClrMapping/>
-  </p:clrMapOvr>
-  <mc:AlternateContent xmlns:mc="http://schemas.openxmlformats.org/markup-compatibility/2006" xmlns:p14="http://schemas.microsoft.com/office/powerpoint/2010/main">
-    <mc:Choice Requires="p14">
-      <p:transition spd="slow" p14:dur="1300">
-        <p14:pan dir="u"/>
-      </p:transition>
-    </mc:Choice>
-    <mc:Fallback xmlns="">
-      <p:transition spd="slow">
-        <p:fade/>
-      </p:transition>
-    </mc:Fallback>
-  </mc:AlternateContent>
-</p:sld>
-</file>
-
 <file path=ppt/slides/slide4.xml><?xml version="1.0" encoding="utf-8"?>
 <p:sld xmlns:a="http://schemas.openxmlformats.org/drawingml/2006/main" xmlns:r="http://schemas.openxmlformats.org/officeDocument/2006/relationships" xmlns:p="http://schemas.openxmlformats.org/presentationml/2006/main">
   <p:cSld>
@@ -10219,6 +10253,12 @@
             <a:r>
               <a:rPr lang="en-US" dirty="0"/>
               <a:t>DSC Components</a:t>
+            </a:r>
+          </a:p>
+          <a:p>
+            <a:r>
+              <a:rPr lang="en-US" dirty="0"/>
+              <a:t>Imperative vs Declarative</a:t>
             </a:r>
           </a:p>
           <a:p>
@@ -10313,6 +10353,106 @@
       </p:grpSpPr>
       <p:sp>
         <p:nvSpPr>
+          <p:cNvPr id="2" name="Title 1"/>
+          <p:cNvSpPr>
+            <a:spLocks noGrp="1"/>
+          </p:cNvSpPr>
+          <p:nvPr>
+            <p:ph type="title"/>
+          </p:nvPr>
+        </p:nvSpPr>
+        <p:spPr/>
+        <p:txBody>
+          <a:bodyPr/>
+          <a:lstStyle/>
+          <a:p>
+            <a:r>
+              <a:rPr lang="en-US" dirty="0"/>
+              <a:t>Start-Demo –Item ‘</a:t>
+            </a:r>
+            <a:r>
+              <a:rPr lang="en-US" dirty="0" err="1"/>
+              <a:t>DSCPullService</a:t>
+            </a:r>
+            <a:r>
+              <a:rPr lang="en-US" dirty="0"/>
+              <a:t>’</a:t>
+            </a:r>
+          </a:p>
+        </p:txBody>
+      </p:sp>
+      <p:sp>
+        <p:nvSpPr>
+          <p:cNvPr id="3" name="Text Placeholder 2"/>
+          <p:cNvSpPr>
+            <a:spLocks noGrp="1"/>
+          </p:cNvSpPr>
+          <p:nvPr>
+            <p:ph type="body" idx="1"/>
+          </p:nvPr>
+        </p:nvSpPr>
+        <p:spPr/>
+        <p:txBody>
+          <a:bodyPr/>
+          <a:lstStyle/>
+          <a:p>
+            <a:r>
+              <a:rPr lang="en-US" dirty="0"/>
+              <a:t>configuring Rest-Baser Pull Server</a:t>
+            </a:r>
+          </a:p>
+          <a:p>
+            <a:r>
+              <a:rPr lang="en-US" dirty="0"/>
+              <a:t>Configuring LCM as a pull client</a:t>
+            </a:r>
+          </a:p>
+        </p:txBody>
+      </p:sp>
+    </p:spTree>
+    <p:extLst>
+      <p:ext uri="{BB962C8B-B14F-4D97-AF65-F5344CB8AC3E}">
+        <p14:creationId xmlns:p14="http://schemas.microsoft.com/office/powerpoint/2010/main" val="1741091451"/>
+      </p:ext>
+    </p:extLst>
+  </p:cSld>
+  <p:clrMapOvr>
+    <a:masterClrMapping/>
+  </p:clrMapOvr>
+  <mc:AlternateContent xmlns:mc="http://schemas.openxmlformats.org/markup-compatibility/2006" xmlns:p14="http://schemas.microsoft.com/office/powerpoint/2010/main">
+    <mc:Choice Requires="p14">
+      <p:transition spd="slow" p14:dur="1300">
+        <p14:pan dir="u"/>
+      </p:transition>
+    </mc:Choice>
+    <mc:Fallback xmlns="">
+      <p:transition spd="slow">
+        <p:fade/>
+      </p:transition>
+    </mc:Fallback>
+  </mc:AlternateContent>
+</p:sld>
+</file>
+
+<file path=ppt/slides/slide41.xml><?xml version="1.0" encoding="utf-8"?>
+<p:sld xmlns:a="http://schemas.openxmlformats.org/drawingml/2006/main" xmlns:r="http://schemas.openxmlformats.org/officeDocument/2006/relationships" xmlns:p="http://schemas.openxmlformats.org/presentationml/2006/main">
+  <p:cSld>
+    <p:spTree>
+      <p:nvGrpSpPr>
+        <p:cNvPr id="1" name=""/>
+        <p:cNvGrpSpPr/>
+        <p:nvPr/>
+      </p:nvGrpSpPr>
+      <p:grpSpPr>
+        <a:xfrm>
+          <a:off x="0" y="0"/>
+          <a:ext cx="0" cy="0"/>
+          <a:chOff x="0" y="0"/>
+          <a:chExt cx="0" cy="0"/>
+        </a:xfrm>
+      </p:grpSpPr>
+      <p:sp>
+        <p:nvSpPr>
           <p:cNvPr id="2" name="Titel 1"/>
           <p:cNvSpPr>
             <a:spLocks noGrp="1"/>
@@ -10400,7 +10540,7 @@
 </p:sld>
 </file>
 
-<file path=ppt/slides/slide41.xml><?xml version="1.0" encoding="utf-8"?>
+<file path=ppt/slides/slide42.xml><?xml version="1.0" encoding="utf-8"?>
 <p:sld xmlns:a="http://schemas.openxmlformats.org/drawingml/2006/main" xmlns:r="http://schemas.openxmlformats.org/officeDocument/2006/relationships" xmlns:p="http://schemas.openxmlformats.org/presentationml/2006/main">
   <p:cSld>
     <p:spTree>
@@ -10494,7 +10634,7 @@
 </p:sld>
 </file>
 
-<file path=ppt/slides/slide42.xml><?xml version="1.0" encoding="utf-8"?>
+<file path=ppt/slides/slide43.xml><?xml version="1.0" encoding="utf-8"?>
 <p:sld xmlns:a="http://schemas.openxmlformats.org/drawingml/2006/main" xmlns:r="http://schemas.openxmlformats.org/officeDocument/2006/relationships" xmlns:p="http://schemas.openxmlformats.org/presentationml/2006/main">
   <p:cSld>
     <p:spTree>
@@ -10606,7 +10746,7 @@
 </p:sld>
 </file>
 
-<file path=ppt/slides/slide43.xml><?xml version="1.0" encoding="utf-8"?>
+<file path=ppt/slides/slide44.xml><?xml version="1.0" encoding="utf-8"?>
 <p:sld xmlns:a="http://schemas.openxmlformats.org/drawingml/2006/main" xmlns:r="http://schemas.openxmlformats.org/officeDocument/2006/relationships" xmlns:p="http://schemas.openxmlformats.org/presentationml/2006/main">
   <p:cSld>
     <p:spTree>
@@ -10718,7 +10858,7 @@
 </p:sld>
 </file>
 
-<file path=ppt/slides/slide44.xml><?xml version="1.0" encoding="utf-8"?>
+<file path=ppt/slides/slide45.xml><?xml version="1.0" encoding="utf-8"?>
 <p:sld xmlns:a="http://schemas.openxmlformats.org/drawingml/2006/main" xmlns:r="http://schemas.openxmlformats.org/officeDocument/2006/relationships" xmlns:p="http://schemas.openxmlformats.org/presentationml/2006/main">
   <p:cSld>
     <p:spTree>
@@ -11180,68 +11320,6 @@
       </p:grpSpPr>
       <p:sp>
         <p:nvSpPr>
-          <p:cNvPr id="2" name="Content Placeholder 1"/>
-          <p:cNvSpPr>
-            <a:spLocks noGrp="1"/>
-          </p:cNvSpPr>
-          <p:nvPr>
-            <p:ph idx="1"/>
-          </p:nvPr>
-        </p:nvSpPr>
-        <p:spPr/>
-        <p:txBody>
-          <a:bodyPr/>
-          <a:lstStyle/>
-          <a:p>
-            <a:r>
-              <a:rPr lang="en-US" dirty="0"/>
-              <a:t>Version 1.0 was released with WMF 4.0</a:t>
-            </a:r>
-          </a:p>
-          <a:p>
-            <a:pPr lvl="1"/>
-            <a:r>
-              <a:rPr lang="en-US" dirty="0"/>
-              <a:t>Subsequent update as November 2014 Rollup</a:t>
-            </a:r>
-          </a:p>
-          <a:p>
-            <a:pPr lvl="1"/>
-            <a:r>
-              <a:rPr lang="en-US" dirty="0">
-                <a:effectLst/>
-              </a:rPr>
-              <a:t>http://support.microsoft.com/en-us/kb/3000850 </a:t>
-            </a:r>
-          </a:p>
-          <a:p>
-            <a:r>
-              <a:rPr lang="en-US" dirty="0">
-                <a:effectLst/>
-              </a:rPr>
-              <a:t>Version 2.0 was released with WMF 5.0</a:t>
-            </a:r>
-          </a:p>
-          <a:p>
-            <a:pPr lvl="1"/>
-            <a:r>
-              <a:rPr lang="en-US" dirty="0">
-                <a:effectLst/>
-              </a:rPr>
-              <a:t>Updated with WMF 5.1</a:t>
-            </a:r>
-          </a:p>
-          <a:p>
-            <a:pPr lvl="1"/>
-            <a:r>
-              <a:rPr lang="en-US" dirty="0"/>
-              <a:t>https://www.microsoft.com/en-us/download/details.aspx?id=54616</a:t>
-            </a:r>
-          </a:p>
-        </p:txBody>
-      </p:sp>
-      <p:sp>
-        <p:nvSpPr>
           <p:cNvPr id="3" name="Title 2"/>
           <p:cNvSpPr>
             <a:spLocks noGrp="1"/>
@@ -11257,15 +11335,123 @@
           <a:p>
             <a:r>
               <a:rPr lang="en-US" dirty="0"/>
-              <a:t>History</a:t>
-            </a:r>
-          </a:p>
-        </p:txBody>
-      </p:sp>
+              <a:t>Imperative vs Declarative</a:t>
+            </a:r>
+          </a:p>
+        </p:txBody>
+      </p:sp>
+      <p:sp>
+        <p:nvSpPr>
+          <p:cNvPr id="5" name="TextBox 4"/>
+          <p:cNvSpPr txBox="1"/>
+          <p:nvPr/>
+        </p:nvSpPr>
+        <p:spPr>
+          <a:xfrm>
+            <a:off x="81054" y="3861048"/>
+            <a:ext cx="1752403" cy="461665"/>
+          </a:xfrm>
+          <a:prstGeom prst="rect">
+            <a:avLst/>
+          </a:prstGeom>
+          <a:noFill/>
+        </p:spPr>
+        <p:txBody>
+          <a:bodyPr wrap="none" rtlCol="0">
+            <a:spAutoFit/>
+          </a:bodyPr>
+          <a:lstStyle/>
+          <a:p>
+            <a:r>
+              <a:rPr lang="en-US" sz="2400" b="1" dirty="0"/>
+              <a:t>Declarative:</a:t>
+            </a:r>
+            <a:endParaRPr lang="en-US" b="1" dirty="0"/>
+          </a:p>
+        </p:txBody>
+      </p:sp>
+      <p:sp>
+        <p:nvSpPr>
+          <p:cNvPr id="6" name="TextBox 5"/>
+          <p:cNvSpPr txBox="1"/>
+          <p:nvPr/>
+        </p:nvSpPr>
+        <p:spPr>
+          <a:xfrm>
+            <a:off x="107504" y="1844824"/>
+            <a:ext cx="1699504" cy="461665"/>
+          </a:xfrm>
+          <a:prstGeom prst="rect">
+            <a:avLst/>
+          </a:prstGeom>
+          <a:noFill/>
+        </p:spPr>
+        <p:txBody>
+          <a:bodyPr wrap="none" rtlCol="0">
+            <a:spAutoFit/>
+          </a:bodyPr>
+          <a:lstStyle/>
+          <a:p>
+            <a:r>
+              <a:rPr lang="en-US" sz="2400" b="1" dirty="0"/>
+              <a:t>Imperative:</a:t>
+            </a:r>
+            <a:endParaRPr lang="en-US" sz="2000" b="1" dirty="0"/>
+          </a:p>
+        </p:txBody>
+      </p:sp>
+      <p:pic>
+        <p:nvPicPr>
+          <p:cNvPr id="7" name="Picture 6"/>
+          <p:cNvPicPr>
+            <a:picLocks noChangeAspect="1"/>
+          </p:cNvPicPr>
+          <p:nvPr/>
+        </p:nvPicPr>
+        <p:blipFill>
+          <a:blip r:embed="rId2"/>
+          <a:stretch>
+            <a:fillRect/>
+          </a:stretch>
+        </p:blipFill>
+        <p:spPr>
+          <a:xfrm>
+            <a:off x="2081849" y="3933056"/>
+            <a:ext cx="3535530" cy="1675419"/>
+          </a:xfrm>
+          <a:prstGeom prst="rect">
+            <a:avLst/>
+          </a:prstGeom>
+        </p:spPr>
+      </p:pic>
+      <p:pic>
+        <p:nvPicPr>
+          <p:cNvPr id="8" name="Picture 7"/>
+          <p:cNvPicPr>
+            <a:picLocks noChangeAspect="1"/>
+          </p:cNvPicPr>
+          <p:nvPr/>
+        </p:nvPicPr>
+        <p:blipFill>
+          <a:blip r:embed="rId3"/>
+          <a:stretch>
+            <a:fillRect/>
+          </a:stretch>
+        </p:blipFill>
+        <p:spPr>
+          <a:xfrm>
+            <a:off x="2051720" y="1916832"/>
+            <a:ext cx="6978677" cy="912981"/>
+          </a:xfrm>
+          <a:prstGeom prst="rect">
+            <a:avLst/>
+          </a:prstGeom>
+        </p:spPr>
+      </p:pic>
     </p:spTree>
     <p:extLst>
       <p:ext uri="{BB962C8B-B14F-4D97-AF65-F5344CB8AC3E}">
-        <p14:creationId xmlns:p14="http://schemas.microsoft.com/office/powerpoint/2010/main" val="616588595"/>
+        <p14:creationId xmlns:p14="http://schemas.microsoft.com/office/powerpoint/2010/main" val="3271551611"/>
       </p:ext>
     </p:extLst>
   </p:cSld>
@@ -11320,10 +11506,24 @@
           <a:lstStyle/>
           <a:p>
             <a:r>
+              <a:rPr lang="en-US" dirty="0"/>
+              <a:t>Version 1.0 was released with WMF 4.0</a:t>
+            </a:r>
+          </a:p>
+          <a:p>
+            <a:pPr lvl="1"/>
+            <a:r>
+              <a:rPr lang="en-US" dirty="0"/>
+              <a:t>Subsequent update as November 2014 Rollup</a:t>
+            </a:r>
+          </a:p>
+          <a:p>
+            <a:pPr lvl="1"/>
+            <a:r>
               <a:rPr lang="en-US" dirty="0">
                 <a:effectLst/>
               </a:rPr>
-              <a:t>Windows Server 2012 R2</a:t>
+              <a:t>http://support.microsoft.com/en-us/kb/3000850 </a:t>
             </a:r>
           </a:p>
           <a:p>
@@ -11331,44 +11531,23 @@
               <a:rPr lang="en-US" dirty="0">
                 <a:effectLst/>
               </a:rPr>
-              <a:t>Windows Server 2012</a:t>
-            </a:r>
-          </a:p>
-          <a:p>
+              <a:t>Version 2.0 was released with WMF 5.0</a:t>
+            </a:r>
+          </a:p>
+          <a:p>
+            <a:pPr lvl="1"/>
             <a:r>
               <a:rPr lang="en-US" dirty="0">
                 <a:effectLst/>
               </a:rPr>
-              <a:t>Windows Server 2008 R2 SP1</a:t>
-            </a:r>
-          </a:p>
-          <a:p>
-            <a:r>
-              <a:rPr lang="en-US" dirty="0">
-                <a:effectLst/>
-              </a:rPr>
-              <a:t>Windows 8.1</a:t>
-            </a:r>
-          </a:p>
-          <a:p>
-            <a:r>
-              <a:rPr lang="en-US" dirty="0">
-                <a:effectLst/>
-              </a:rPr>
-              <a:t>Windows 7 SP1</a:t>
-            </a:r>
-          </a:p>
-          <a:p>
+              <a:t>Updated with WMF 5.1</a:t>
+            </a:r>
+          </a:p>
+          <a:p>
+            <a:pPr lvl="1"/>
             <a:r>
               <a:rPr lang="en-US" dirty="0"/>
-              <a:t>Not applicable for Windows Server 2016</a:t>
-            </a:r>
-          </a:p>
-          <a:p>
-            <a:pPr lvl="1"/>
-            <a:r>
-              <a:rPr lang="en-US" dirty="0"/>
-              <a:t>Includes WMF 5.1 level components already</a:t>
+              <a:t>https://www.microsoft.com/en-us/download/details.aspx?id=54616</a:t>
             </a:r>
           </a:p>
         </p:txBody>
@@ -11390,7 +11569,7 @@
           <a:p>
             <a:r>
               <a:rPr lang="en-US" dirty="0"/>
-              <a:t>WMF 5.1 support</a:t>
+              <a:t>History</a:t>
             </a:r>
           </a:p>
         </p:txBody>
@@ -11398,7 +11577,7 @@
     </p:spTree>
     <p:extLst>
       <p:ext uri="{BB962C8B-B14F-4D97-AF65-F5344CB8AC3E}">
-        <p14:creationId xmlns:p14="http://schemas.microsoft.com/office/powerpoint/2010/main" val="3674710944"/>
+        <p14:creationId xmlns:p14="http://schemas.microsoft.com/office/powerpoint/2010/main" val="616588595"/>
       </p:ext>
     </p:extLst>
   </p:cSld>

</xml_diff>